<commit_message>
corection orthographe +pdf de la presentation
</commit_message>
<xml_diff>
--- a/presentation_final/Présentation_finale.pptx
+++ b/presentation_final/Présentation_finale.pptx
@@ -142,6 +142,7 @@
 <file path=ppt/revisionInfo.xml><?xml version="1.0" encoding="utf-8"?>
 <p1510:revInfo xmlns:a="http://schemas.openxmlformats.org/drawingml/2006/main" xmlns:r="http://schemas.openxmlformats.org/officeDocument/2006/relationships" xmlns:p1510="http://schemas.microsoft.com/office/powerpoint/2015/10/main">
   <p1510:revLst>
+    <p1510:client id="{0A85AE1C-0F6D-4B01-A1B2-97A22A3A93EE}" v="48" dt="2022-09-20T08:01:52.972"/>
     <p1510:client id="{13C72FE5-64AE-45C7-BAFD-168BD2EE48D7}" v="831" dt="2022-09-19T09:15:00.251"/>
     <p1510:client id="{385445BF-4E34-4F5F-A09D-C98FC4300DB6}" v="24" dt="2022-09-19T15:37:48.887"/>
     <p1510:client id="{C8797383-AE01-4A13-896E-3BDCB0A94B55}" v="1726" dt="2022-09-15T14:06:01.917"/>
@@ -149,6 +150,156 @@
     <p1510:client id="{D7A9525A-5F2C-49FF-A06E-E1C61B154A2E}" v="581" dt="2022-09-16T09:37:42.426"/>
   </p1510:revLst>
 </p1510:revInfo>
+</file>
+
+<file path=ppt/changesInfos/changesInfo1.xml><?xml version="1.0" encoding="utf-8"?>
+<pc:chgInfo xmlns:a="http://schemas.openxmlformats.org/drawingml/2006/main" xmlns:r="http://schemas.openxmlformats.org/officeDocument/2006/relationships" xmlns:ac="http://schemas.microsoft.com/office/drawing/2013/main/command" xmlns:pc="http://schemas.microsoft.com/office/powerpoint/2013/main/command">
+  <pc:docChgLst>
+    <pc:chgData name="clement fert" userId="2732b0407c83676e" providerId="Windows Live" clId="Web-{0A85AE1C-0F6D-4B01-A1B2-97A22A3A93EE}"/>
+    <pc:docChg chg="modSld">
+      <pc:chgData name="clement fert" userId="2732b0407c83676e" providerId="Windows Live" clId="Web-{0A85AE1C-0F6D-4B01-A1B2-97A22A3A93EE}" dt="2022-09-20T08:01:52.972" v="40" actId="20577"/>
+      <pc:docMkLst>
+        <pc:docMk/>
+      </pc:docMkLst>
+      <pc:sldChg chg="modSp">
+        <pc:chgData name="clement fert" userId="2732b0407c83676e" providerId="Windows Live" clId="Web-{0A85AE1C-0F6D-4B01-A1B2-97A22A3A93EE}" dt="2022-09-20T07:23:37.534" v="0" actId="20577"/>
+        <pc:sldMkLst>
+          <pc:docMk/>
+          <pc:sldMk cId="1329746698" sldId="283"/>
+        </pc:sldMkLst>
+        <pc:spChg chg="mod">
+          <ac:chgData name="clement fert" userId="2732b0407c83676e" providerId="Windows Live" clId="Web-{0A85AE1C-0F6D-4B01-A1B2-97A22A3A93EE}" dt="2022-09-20T07:23:37.534" v="0" actId="20577"/>
+          <ac:spMkLst>
+            <pc:docMk/>
+            <pc:sldMk cId="1329746698" sldId="283"/>
+            <ac:spMk id="4" creationId="{D355C61F-C8F1-4977-8E1F-F16C0D9EA88C}"/>
+          </ac:spMkLst>
+        </pc:spChg>
+      </pc:sldChg>
+      <pc:sldChg chg="modSp">
+        <pc:chgData name="clement fert" userId="2732b0407c83676e" providerId="Windows Live" clId="Web-{0A85AE1C-0F6D-4B01-A1B2-97A22A3A93EE}" dt="2022-09-20T07:25:33.162" v="11" actId="20577"/>
+        <pc:sldMkLst>
+          <pc:docMk/>
+          <pc:sldMk cId="3188837873" sldId="284"/>
+        </pc:sldMkLst>
+        <pc:spChg chg="mod">
+          <ac:chgData name="clement fert" userId="2732b0407c83676e" providerId="Windows Live" clId="Web-{0A85AE1C-0F6D-4B01-A1B2-97A22A3A93EE}" dt="2022-09-20T07:24:13.441" v="2" actId="20577"/>
+          <ac:spMkLst>
+            <pc:docMk/>
+            <pc:sldMk cId="3188837873" sldId="284"/>
+            <ac:spMk id="3" creationId="{7CA42D59-EAD6-4F95-84F1-32A30F057856}"/>
+          </ac:spMkLst>
+        </pc:spChg>
+        <pc:spChg chg="mod">
+          <ac:chgData name="clement fert" userId="2732b0407c83676e" providerId="Windows Live" clId="Web-{0A85AE1C-0F6D-4B01-A1B2-97A22A3A93EE}" dt="2022-09-20T07:25:33.162" v="11" actId="20577"/>
+          <ac:spMkLst>
+            <pc:docMk/>
+            <pc:sldMk cId="3188837873" sldId="284"/>
+            <ac:spMk id="5" creationId="{CEEB3BAE-C0B2-447C-B8BE-96C6BD84D658}"/>
+          </ac:spMkLst>
+        </pc:spChg>
+        <pc:spChg chg="mod">
+          <ac:chgData name="clement fert" userId="2732b0407c83676e" providerId="Windows Live" clId="Web-{0A85AE1C-0F6D-4B01-A1B2-97A22A3A93EE}" dt="2022-09-20T07:25:04.067" v="7" actId="20577"/>
+          <ac:spMkLst>
+            <pc:docMk/>
+            <pc:sldMk cId="3188837873" sldId="284"/>
+            <ac:spMk id="6" creationId="{B237D1CA-B91A-410E-A968-D017BBE99F99}"/>
+          </ac:spMkLst>
+        </pc:spChg>
+      </pc:sldChg>
+      <pc:sldChg chg="modSp">
+        <pc:chgData name="clement fert" userId="2732b0407c83676e" providerId="Windows Live" clId="Web-{0A85AE1C-0F6D-4B01-A1B2-97A22A3A93EE}" dt="2022-09-20T07:33:58.816" v="21" actId="20577"/>
+        <pc:sldMkLst>
+          <pc:docMk/>
+          <pc:sldMk cId="2575421478" sldId="295"/>
+        </pc:sldMkLst>
+        <pc:spChg chg="mod">
+          <ac:chgData name="clement fert" userId="2732b0407c83676e" providerId="Windows Live" clId="Web-{0A85AE1C-0F6D-4B01-A1B2-97A22A3A93EE}" dt="2022-09-20T07:33:58.816" v="21" actId="20577"/>
+          <ac:spMkLst>
+            <pc:docMk/>
+            <pc:sldMk cId="2575421478" sldId="295"/>
+            <ac:spMk id="3" creationId="{F204AFD2-303D-4B48-AA3E-C96B74D8127A}"/>
+          </ac:spMkLst>
+        </pc:spChg>
+      </pc:sldChg>
+      <pc:sldChg chg="modSp">
+        <pc:chgData name="clement fert" userId="2732b0407c83676e" providerId="Windows Live" clId="Web-{0A85AE1C-0F6D-4B01-A1B2-97A22A3A93EE}" dt="2022-09-20T07:33:56.175" v="20" actId="20577"/>
+        <pc:sldMkLst>
+          <pc:docMk/>
+          <pc:sldMk cId="2822360336" sldId="302"/>
+        </pc:sldMkLst>
+        <pc:spChg chg="mod">
+          <ac:chgData name="clement fert" userId="2732b0407c83676e" providerId="Windows Live" clId="Web-{0A85AE1C-0F6D-4B01-A1B2-97A22A3A93EE}" dt="2022-09-20T07:33:56.175" v="20" actId="20577"/>
+          <ac:spMkLst>
+            <pc:docMk/>
+            <pc:sldMk cId="2822360336" sldId="302"/>
+            <ac:spMk id="3" creationId="{F204AFD2-303D-4B48-AA3E-C96B74D8127A}"/>
+          </ac:spMkLst>
+        </pc:spChg>
+      </pc:sldChg>
+      <pc:sldChg chg="modSp">
+        <pc:chgData name="clement fert" userId="2732b0407c83676e" providerId="Windows Live" clId="Web-{0A85AE1C-0F6D-4B01-A1B2-97A22A3A93EE}" dt="2022-09-20T07:34:06.316" v="22" actId="20577"/>
+        <pc:sldMkLst>
+          <pc:docMk/>
+          <pc:sldMk cId="4053741984" sldId="303"/>
+        </pc:sldMkLst>
+        <pc:spChg chg="mod">
+          <ac:chgData name="clement fert" userId="2732b0407c83676e" providerId="Windows Live" clId="Web-{0A85AE1C-0F6D-4B01-A1B2-97A22A3A93EE}" dt="2022-09-20T07:34:06.316" v="22" actId="20577"/>
+          <ac:spMkLst>
+            <pc:docMk/>
+            <pc:sldMk cId="4053741984" sldId="303"/>
+            <ac:spMk id="3" creationId="{F204AFD2-303D-4B48-AA3E-C96B74D8127A}"/>
+          </ac:spMkLst>
+        </pc:spChg>
+      </pc:sldChg>
+      <pc:sldChg chg="modSp">
+        <pc:chgData name="clement fert" userId="2732b0407c83676e" providerId="Windows Live" clId="Web-{0A85AE1C-0F6D-4B01-A1B2-97A22A3A93EE}" dt="2022-09-20T07:53:40.916" v="31" actId="20577"/>
+        <pc:sldMkLst>
+          <pc:docMk/>
+          <pc:sldMk cId="2346558433" sldId="304"/>
+        </pc:sldMkLst>
+        <pc:spChg chg="mod">
+          <ac:chgData name="clement fert" userId="2732b0407c83676e" providerId="Windows Live" clId="Web-{0A85AE1C-0F6D-4B01-A1B2-97A22A3A93EE}" dt="2022-09-20T07:53:40.916" v="31" actId="20577"/>
+          <ac:spMkLst>
+            <pc:docMk/>
+            <pc:sldMk cId="2346558433" sldId="304"/>
+            <ac:spMk id="3" creationId="{F204AFD2-303D-4B48-AA3E-C96B74D8127A}"/>
+          </ac:spMkLst>
+        </pc:spChg>
+      </pc:sldChg>
+      <pc:sldChg chg="modSp">
+        <pc:chgData name="clement fert" userId="2732b0407c83676e" providerId="Windows Live" clId="Web-{0A85AE1C-0F6D-4B01-A1B2-97A22A3A93EE}" dt="2022-09-20T08:00:46.174" v="36" actId="20577"/>
+        <pc:sldMkLst>
+          <pc:docMk/>
+          <pc:sldMk cId="1535669580" sldId="305"/>
+        </pc:sldMkLst>
+        <pc:spChg chg="mod">
+          <ac:chgData name="clement fert" userId="2732b0407c83676e" providerId="Windows Live" clId="Web-{0A85AE1C-0F6D-4B01-A1B2-97A22A3A93EE}" dt="2022-09-20T08:00:46.174" v="36" actId="20577"/>
+          <ac:spMkLst>
+            <pc:docMk/>
+            <pc:sldMk cId="1535669580" sldId="305"/>
+            <ac:spMk id="3" creationId="{F204AFD2-303D-4B48-AA3E-C96B74D8127A}"/>
+          </ac:spMkLst>
+        </pc:spChg>
+      </pc:sldChg>
+      <pc:sldChg chg="modSp">
+        <pc:chgData name="clement fert" userId="2732b0407c83676e" providerId="Windows Live" clId="Web-{0A85AE1C-0F6D-4B01-A1B2-97A22A3A93EE}" dt="2022-09-20T08:01:52.972" v="40" actId="20577"/>
+        <pc:sldMkLst>
+          <pc:docMk/>
+          <pc:sldMk cId="1414619624" sldId="310"/>
+        </pc:sldMkLst>
+        <pc:spChg chg="mod">
+          <ac:chgData name="clement fert" userId="2732b0407c83676e" providerId="Windows Live" clId="Web-{0A85AE1C-0F6D-4B01-A1B2-97A22A3A93EE}" dt="2022-09-20T08:01:52.972" v="40" actId="20577"/>
+          <ac:spMkLst>
+            <pc:docMk/>
+            <pc:sldMk cId="1414619624" sldId="310"/>
+            <ac:spMk id="3" creationId="{F204AFD2-303D-4B48-AA3E-C96B74D8127A}"/>
+          </ac:spMkLst>
+        </pc:spChg>
+      </pc:sldChg>
+    </pc:docChg>
+  </pc:docChgLst>
+</pc:chgInfo>
 </file>
 
 <file path=ppt/charts/chart1.xml><?xml version="1.0" encoding="utf-8"?>
@@ -3302,7 +3453,7 @@
             <a:pPr rtl="0"/>
             <a:fld id="{D6AD8227-F199-4F72-80A6-0D629F6C6B79}" type="datetime1">
               <a:rPr lang="fr-FR" smtClean="0"/>
-              <a:t>19/09/2022</a:t>
+              <a:t>20/09/2022</a:t>
             </a:fld>
             <a:endParaRPr lang="fr-FR"/>
           </a:p>
@@ -3484,7 +3635,7 @@
             <a:pPr rtl="0"/>
             <a:fld id="{E7762B17-E8DE-4AEA-9CF5-AF6B0C183EA3}" type="datetime1">
               <a:rPr lang="fr-FR" noProof="0" smtClean="0"/>
-              <a:t>19/09/2022</a:t>
+              <a:t>20/09/2022</a:t>
             </a:fld>
             <a:endParaRPr lang="fr-FR" noProof="0"/>
           </a:p>
@@ -15608,7 +15759,7 @@
             </a:pPr>
             <a:r>
               <a:rPr lang="fr-FR" dirty="0"/>
-              <a:t>Le corp de la page avec les nombreuses questions que l'utilisateur  se pose. L'utilisateur peu en sélectionner une pour avoir la réponse à cette question sous la forme d'un article(ce site étant un prototype il y a que l'article sur "comment agit un vaccin").</a:t>
+              <a:t>Le corps de la page avec les nombreuses questions que l'utilisateur  se pose. L'utilisateur peu en sélectionner une pour avoir la réponse à cette question sous la forme d'un article(ce site étant un prototype il y a que l'article sur "comment agit un vaccin").</a:t>
             </a:r>
           </a:p>
           <a:p>
@@ -15623,7 +15774,7 @@
             </a:pPr>
             <a:r>
               <a:rPr lang="fr-FR" dirty="0"/>
-              <a:t>Bas de page avec le logo qui prouve que la fiabilité de notre site ainsi qu'un lien pour revenir vers les menu principal. </a:t>
+              <a:t>Bas de page avec le logo qui prouve  la fiabilité de notre site ainsi qu'un lien pour revenir vers le menu principal. </a:t>
             </a:r>
           </a:p>
           <a:p>
@@ -15876,11 +16027,18 @@
               <a:buChar char="•"/>
             </a:pPr>
             <a:r>
+              <a:rPr lang="fr-FR">
+                <a:ea typeface="+mn-lt"/>
+                <a:cs typeface="+mn-lt"/>
+              </a:rPr>
+              <a:t>Le corps de la page avec </a:t>
+            </a:r>
+            <a:r>
               <a:rPr lang="fr-FR" dirty="0">
                 <a:ea typeface="+mn-lt"/>
                 <a:cs typeface="+mn-lt"/>
               </a:rPr>
-              <a:t>Le corp de la page avec trois onglets  permettant à l'utilisateur de sélectionner la stratégie qui l'intéresse une fois sélectionner un onglet apparaitra.</a:t>
+              <a:t>trois onglets  permettant à l'utilisateur de sélectionner la stratégie qui l'intéresse une fois sélectionner un onglet apparaitra.</a:t>
             </a:r>
           </a:p>
           <a:p>
@@ -16151,7 +16309,7 @@
                 <a:ea typeface="+mn-lt"/>
                 <a:cs typeface="+mn-lt"/>
               </a:rPr>
-              <a:t>Le corp de la page est fait deux colonnes la première colonne est un formulaire de contact celui–ci permet de signaler sa volonté de s'engager contre le covid. Une fois le formulaire remplie l'administrateur recevra un email avec les information de l'utilisateur concerné. La deuxième colonne servira a trouvé le centre de vaccination le plus proche de chez soi une fois que l'API sur les centres de vaccination sera à jour.</a:t>
+              <a:t>Le corps de la page est fait de deux colonnes la première colonne est un formulaire de contact celui–ci permet de signaler sa volonté de s'engager contre le covid. Une fois le formulaire remplie l'administrateur recevra un email avec les informations de l'utilisateur concerné. La deuxième colonne servira à trouver le centre de vaccination le plus proche de chez soi une fois que l'API sur les centres de vaccination sera à jour.</a:t>
             </a:r>
             <a:endParaRPr lang="fr-FR" dirty="0" err="1"/>
           </a:p>
@@ -16432,7 +16590,7 @@
           <a:p>
             <a:r>
               <a:rPr lang="fr-FR" dirty="0"/>
-              <a:t>Ce plugin nous permet d'intégrer des formulaires sur notre site et de conserver la même mise en page. J'ai donc décidé de l'activé sur toutes les pages de mon site.</a:t>
+              <a:t>Ce plugin nous permet d'intégrer des formulaires sur notre site et de conserver la même mise en page. J'ai donc décidé de l'activer sur toutes les pages de mon site.</a:t>
             </a:r>
           </a:p>
           <a:p>
@@ -16455,7 +16613,7 @@
             </a:r>
             <a:r>
               <a:rPr lang="fr-FR" dirty="0"/>
-              <a:t> on affiche un article ceci me paraissais plus cohérent car ce site étant destiné pour le gouvernement on peut imaginer que certain membre du gouvernement auront un rôle de contributeur, éditeur ou auteur leur permettant de gérer ses articles.</a:t>
+              <a:t> on affiche un article ceci me paraissais plus cohérent car ce site étant destiné pour le gouvernement on peut imaginer que certains membres du gouvernement auront un rôle de contributeur, éditeur ou auteur leurs permettant de gérer ses articles.</a:t>
             </a:r>
           </a:p>
           <a:p>
@@ -17800,7 +17958,7 @@
           <a:p>
             <a:r>
               <a:rPr lang="fr-FR" dirty="0"/>
-              <a:t> Vous avez pu observer les différentes maquettes réalisées pour ce site précédemment. Je vais donc justifié mes choix dans ce slide. Comme je l'ai expliqué j'ai voulu réaliser un site le plus accessible possible en respectant la loi de MILNER (3 éléments par menu). De plus afin d'optimiser la lisibilité sur notre site il faut limitée le nombre de couleur à 3. C'est donc naturellement que j'ai choisi le bleu, le blanc et le rouge (les couleurs de la France).   </a:t>
+              <a:t> Vous avez pu observer les différentes maquettes réalisées pour ce site précédemment. Je vais donc justifier mes choix dans ce slide. Comme je l'ai expliqué j'ai voulu réaliser un site le plus accessible possible en respectant la loi de MILNER (3 éléments par menu). De plus afin d'optimiser la lisibilité sur notre site il faut limiter le nombre de couleur à 3. C'est donc naturellement que j'ai choisi le bleu, le blanc et le rouge (les couleurs de la France).   </a:t>
             </a:r>
           </a:p>
         </p:txBody>
@@ -19074,7 +19232,7 @@
             </a:pPr>
             <a:r>
               <a:rPr lang="fr-FR" sz="2800" dirty="0"/>
-              <a:t>Suite à  la correction j'ai décidé de réaliser cette présentation qui devra je l'espère rectifier les éléments manquant.  </a:t>
+              <a:t>Suite à  la correction j'ai décidé de réaliser cette présentation qui devra je l'espère rectifier les éléments manquants.  </a:t>
             </a:r>
           </a:p>
           <a:p>
@@ -20116,7 +20274,7 @@
           <a:p>
             <a:r>
               <a:rPr lang="fr-FR" dirty="0"/>
-              <a:t>Notre site entant pour le gouvernement Français il peut être visité par n'importe quels Français voici les différent profil </a:t>
+              <a:t>Notre site entant pour le gouvernement Français il peut être visité par n'importe quels Français voici les différents profil </a:t>
             </a:r>
             <a:r>
               <a:rPr lang="fr-FR" dirty="0">
@@ -20198,7 +20356,15 @@
           <a:p>
             <a:r>
               <a:rPr lang="fr-FR" dirty="0"/>
-              <a:t>Pour la création de nos persona nous avons utilisé le site Hubspot.fr </a:t>
+              <a:t>Pour la création de nos </a:t>
+            </a:r>
+            <a:r>
+              <a:rPr lang="fr-FR" dirty="0" err="1"/>
+              <a:t>personas</a:t>
+            </a:r>
+            <a:r>
+              <a:rPr lang="fr-FR" dirty="0"/>
+              <a:t> nous avons utilisé le site Hubspot.fr </a:t>
             </a:r>
           </a:p>
           <a:p>
@@ -20231,7 +20397,15 @@
           <a:p>
             <a:r>
               <a:rPr lang="fr-FR" dirty="0"/>
-              <a:t>Voici les lien de persona créer </a:t>
+              <a:t>Voici les liens des </a:t>
+            </a:r>
+            <a:r>
+              <a:rPr lang="fr-FR" dirty="0" err="1"/>
+              <a:t>personas</a:t>
+            </a:r>
+            <a:r>
+              <a:rPr lang="fr-FR" dirty="0"/>
+              <a:t> créer </a:t>
             </a:r>
           </a:p>
         </p:txBody>
@@ -21715,7 +21889,7 @@
             </a:pPr>
             <a:r>
               <a:rPr lang="fr-FR" dirty="0"/>
-              <a:t>Le corp de la page avec trois onglet  permettant à l'utilisateur de sélectionner la futur page.</a:t>
+              <a:t>Le corps de la page avec trois onglets  permettant à l'utilisateur de sélectionner la futur page.</a:t>
             </a:r>
           </a:p>
           <a:p>
@@ -21730,7 +21904,7 @@
             </a:pPr>
             <a:r>
               <a:rPr lang="fr-FR" dirty="0"/>
-              <a:t>Bas de page avec le logo qui prouve que la fiabilité de notre site. </a:t>
+              <a:t>Bas de page avec le logo qui prouve  la fiabilité de notre site. </a:t>
             </a:r>
           </a:p>
           <a:p>

</xml_diff>